<commit_message>
commit prez and rep 10.18
</commit_message>
<xml_diff>
--- a/Capstone2_Final_Presentation.pptx
+++ b/Capstone2_Final_Presentation.pptx
@@ -116,6 +116,11 @@
       </a:defRPr>
     </a:lvl9pPr>
   </p:defaultTextStyle>
+  <p:extLst>
+    <p:ext uri="{EFAFB233-063F-42B5-8137-9DF3F51BA10A}">
+      <p15:sldGuideLst xmlns:p15="http://schemas.microsoft.com/office/powerpoint/2012/main"/>
+    </p:ext>
+  </p:extLst>
 </p:presentation>
 </file>
 
@@ -201,7 +206,7 @@
           <a:p>
             <a:fld id="{F6F82602-1F16-C648-924E-E8B84F6ABC78}" type="datetimeFigureOut">
               <a:rPr lang="en-US" smtClean="0"/>
-              <a:t>10/15/20</a:t>
+              <a:t>10/18/20</a:t>
             </a:fld>
             <a:endParaRPr lang="en-US"/>
           </a:p>
@@ -765,7 +770,7 @@
           <a:p>
             <a:fld id="{7EA32AED-B185-5C4B-A96E-16B0A87C3CCF}" type="datetimeFigureOut">
               <a:rPr lang="en-US" smtClean="0"/>
-              <a:t>10/11/20</a:t>
+              <a:t>10/18/20</a:t>
             </a:fld>
             <a:endParaRPr lang="en-US"/>
           </a:p>
@@ -1056,7 +1061,7 @@
           <a:p>
             <a:fld id="{7EA32AED-B185-5C4B-A96E-16B0A87C3CCF}" type="datetimeFigureOut">
               <a:rPr lang="en-US" smtClean="0"/>
-              <a:t>10/11/20</a:t>
+              <a:t>10/18/20</a:t>
             </a:fld>
             <a:endParaRPr lang="en-US"/>
           </a:p>
@@ -1315,7 +1320,7 @@
           <a:p>
             <a:fld id="{7EA32AED-B185-5C4B-A96E-16B0A87C3CCF}" type="datetimeFigureOut">
               <a:rPr lang="en-US" smtClean="0"/>
-              <a:t>10/11/20</a:t>
+              <a:t>10/18/20</a:t>
             </a:fld>
             <a:endParaRPr lang="en-US"/>
           </a:p>
@@ -1784,7 +1789,7 @@
           <a:p>
             <a:fld id="{7EA32AED-B185-5C4B-A96E-16B0A87C3CCF}" type="datetimeFigureOut">
               <a:rPr lang="en-US" smtClean="0"/>
-              <a:t>10/11/20</a:t>
+              <a:t>10/18/20</a:t>
             </a:fld>
             <a:endParaRPr lang="en-US"/>
           </a:p>
@@ -1964,7 +1969,7 @@
           <a:p>
             <a:fld id="{7EA32AED-B185-5C4B-A96E-16B0A87C3CCF}" type="datetimeFigureOut">
               <a:rPr lang="en-US" smtClean="0"/>
-              <a:t>10/11/20</a:t>
+              <a:t>10/18/20</a:t>
             </a:fld>
             <a:endParaRPr lang="en-US"/>
           </a:p>
@@ -2540,7 +2545,7 @@
           <a:p>
             <a:fld id="{7EA32AED-B185-5C4B-A96E-16B0A87C3CCF}" type="datetimeFigureOut">
               <a:rPr lang="en-US" smtClean="0"/>
-              <a:t>10/11/20</a:t>
+              <a:t>10/18/20</a:t>
             </a:fld>
             <a:endParaRPr lang="en-US"/>
           </a:p>
@@ -2872,7 +2877,7 @@
           <a:p>
             <a:fld id="{7EA32AED-B185-5C4B-A96E-16B0A87C3CCF}" type="datetimeFigureOut">
               <a:rPr lang="en-US" smtClean="0"/>
-              <a:t>10/11/20</a:t>
+              <a:t>10/18/20</a:t>
             </a:fld>
             <a:endParaRPr lang="en-US"/>
           </a:p>
@@ -3047,7 +3052,7 @@
           <a:p>
             <a:fld id="{7EA32AED-B185-5C4B-A96E-16B0A87C3CCF}" type="datetimeFigureOut">
               <a:rPr lang="en-US" smtClean="0"/>
-              <a:t>10/11/20</a:t>
+              <a:t>10/18/20</a:t>
             </a:fld>
             <a:endParaRPr lang="en-US"/>
           </a:p>
@@ -3227,7 +3232,7 @@
           <a:p>
             <a:fld id="{7EA32AED-B185-5C4B-A96E-16B0A87C3CCF}" type="datetimeFigureOut">
               <a:rPr lang="en-US" smtClean="0"/>
-              <a:t>10/11/20</a:t>
+              <a:t>10/18/20</a:t>
             </a:fld>
             <a:endParaRPr lang="en-US"/>
           </a:p>
@@ -3397,7 +3402,7 @@
           <a:p>
             <a:fld id="{7EA32AED-B185-5C4B-A96E-16B0A87C3CCF}" type="datetimeFigureOut">
               <a:rPr lang="en-US" smtClean="0"/>
-              <a:t>10/11/20</a:t>
+              <a:t>10/18/20</a:t>
             </a:fld>
             <a:endParaRPr lang="en-US"/>
           </a:p>
@@ -3654,7 +3659,7 @@
           <a:p>
             <a:fld id="{7EA32AED-B185-5C4B-A96E-16B0A87C3CCF}" type="datetimeFigureOut">
               <a:rPr lang="en-US" smtClean="0"/>
-              <a:t>10/11/20</a:t>
+              <a:t>10/18/20</a:t>
             </a:fld>
             <a:endParaRPr lang="en-US"/>
           </a:p>
@@ -3946,7 +3951,7 @@
           <a:p>
             <a:fld id="{7EA32AED-B185-5C4B-A96E-16B0A87C3CCF}" type="datetimeFigureOut">
               <a:rPr lang="en-US" smtClean="0"/>
-              <a:t>10/11/20</a:t>
+              <a:t>10/18/20</a:t>
             </a:fld>
             <a:endParaRPr lang="en-US"/>
           </a:p>
@@ -4376,7 +4381,7 @@
           <a:p>
             <a:fld id="{7EA32AED-B185-5C4B-A96E-16B0A87C3CCF}" type="datetimeFigureOut">
               <a:rPr lang="en-US" smtClean="0"/>
-              <a:t>10/11/20</a:t>
+              <a:t>10/18/20</a:t>
             </a:fld>
             <a:endParaRPr lang="en-US"/>
           </a:p>
@@ -4494,7 +4499,7 @@
           <a:p>
             <a:fld id="{7EA32AED-B185-5C4B-A96E-16B0A87C3CCF}" type="datetimeFigureOut">
               <a:rPr lang="en-US" smtClean="0"/>
-              <a:t>10/11/20</a:t>
+              <a:t>10/18/20</a:t>
             </a:fld>
             <a:endParaRPr lang="en-US"/>
           </a:p>
@@ -4589,7 +4594,7 @@
           <a:p>
             <a:fld id="{7EA32AED-B185-5C4B-A96E-16B0A87C3CCF}" type="datetimeFigureOut">
               <a:rPr lang="en-US" smtClean="0"/>
-              <a:t>10/11/20</a:t>
+              <a:t>10/18/20</a:t>
             </a:fld>
             <a:endParaRPr lang="en-US"/>
           </a:p>
@@ -4872,7 +4877,7 @@
           <a:p>
             <a:fld id="{7EA32AED-B185-5C4B-A96E-16B0A87C3CCF}" type="datetimeFigureOut">
               <a:rPr lang="en-US" smtClean="0"/>
-              <a:t>10/11/20</a:t>
+              <a:t>10/18/20</a:t>
             </a:fld>
             <a:endParaRPr lang="en-US"/>
           </a:p>
@@ -5163,7 +5168,7 @@
           <a:p>
             <a:fld id="{7EA32AED-B185-5C4B-A96E-16B0A87C3CCF}" type="datetimeFigureOut">
               <a:rPr lang="en-US" smtClean="0"/>
-              <a:t>10/11/20</a:t>
+              <a:t>10/18/20</a:t>
             </a:fld>
             <a:endParaRPr lang="en-US"/>
           </a:p>
@@ -5394,7 +5399,7 @@
           <a:p>
             <a:fld id="{7EA32AED-B185-5C4B-A96E-16B0A87C3CCF}" type="datetimeFigureOut">
               <a:rPr lang="en-US" smtClean="0"/>
-              <a:t>10/11/20</a:t>
+              <a:t>10/18/20</a:t>
             </a:fld>
             <a:endParaRPr lang="en-US"/>
           </a:p>
@@ -7016,7 +7021,12 @@
             <p:ph type="title"/>
           </p:nvPr>
         </p:nvSpPr>
-        <p:spPr/>
+        <p:spPr>
+          <a:xfrm>
+            <a:off x="1141413" y="217714"/>
+            <a:ext cx="9905998" cy="1905000"/>
+          </a:xfrm>
+        </p:spPr>
         <p:txBody>
           <a:bodyPr>
             <a:normAutofit/>
@@ -7051,7 +7061,7 @@
         </p:nvSpPr>
         <p:spPr>
           <a:xfrm>
-            <a:off x="1141413" y="2667000"/>
+            <a:off x="1141412" y="1861457"/>
             <a:ext cx="9905998" cy="1676402"/>
           </a:xfrm>
         </p:spPr>
@@ -7082,10 +7092,10 @@
       </p:sp>
       <p:pic>
         <p:nvPicPr>
-          <p:cNvPr id="8" name="Picture 7">
+          <p:cNvPr id="11" name="Picture 10" descr="Chart, scatter chart&#10;&#10;Description automatically generated">
             <a:extLst>
               <a:ext uri="{FF2B5EF4-FFF2-40B4-BE49-F238E27FC236}">
-                <a16:creationId xmlns:a16="http://schemas.microsoft.com/office/drawing/2014/main" id="{FB6E8BD5-EE9F-B041-8051-89496BDA0FFD}"/>
+                <a16:creationId xmlns:a16="http://schemas.microsoft.com/office/drawing/2014/main" id="{145C7900-8CC7-B04B-8EF9-B0388C128958}"/>
               </a:ext>
             </a:extLst>
           </p:cNvPr>
@@ -7102,8 +7112,38 @@
         </p:blipFill>
         <p:spPr>
           <a:xfrm>
-            <a:off x="1141412" y="4292601"/>
-            <a:ext cx="9905997" cy="1337519"/>
+            <a:off x="5954485" y="3483429"/>
+            <a:ext cx="4587551" cy="3211285"/>
+          </a:xfrm>
+          <a:prstGeom prst="rect">
+            <a:avLst/>
+          </a:prstGeom>
+        </p:spPr>
+      </p:pic>
+      <p:pic>
+        <p:nvPicPr>
+          <p:cNvPr id="12" name="Picture 11">
+            <a:extLst>
+              <a:ext uri="{FF2B5EF4-FFF2-40B4-BE49-F238E27FC236}">
+                <a16:creationId xmlns:a16="http://schemas.microsoft.com/office/drawing/2014/main" id="{8F18CA68-A06A-7C4E-A6AA-B30DED626F30}"/>
+              </a:ext>
+            </a:extLst>
+          </p:cNvPr>
+          <p:cNvPicPr>
+            <a:picLocks noChangeAspect="1"/>
+          </p:cNvPicPr>
+          <p:nvPr/>
+        </p:nvPicPr>
+        <p:blipFill>
+          <a:blip r:embed="rId3"/>
+          <a:stretch>
+            <a:fillRect/>
+          </a:stretch>
+        </p:blipFill>
+        <p:spPr>
+          <a:xfrm>
+            <a:off x="1141411" y="3483428"/>
+            <a:ext cx="4704218" cy="775953"/>
           </a:xfrm>
           <a:prstGeom prst="rect">
             <a:avLst/>
@@ -7212,8 +7252,24 @@
                 <a:latin typeface="Calibri" panose="020F0502020204030204" pitchFamily="34" charset="0"/>
                 <a:cs typeface="Calibri" panose="020F0502020204030204" pitchFamily="34" charset="0"/>
               </a:rPr>
-              <a:t>Impacted by Steroid Era</a:t>
-            </a:r>
+              <a:t>Impacted by </a:t>
+            </a:r>
+            <a:r>
+              <a:rPr lang="en-US" sz="2400">
+                <a:latin typeface="Calibri" panose="020F0502020204030204" pitchFamily="34" charset="0"/>
+                <a:cs typeface="Calibri" panose="020F0502020204030204" pitchFamily="34" charset="0"/>
+              </a:rPr>
+              <a:t>Steroid Era</a:t>
+            </a:r>
+          </a:p>
+          <a:p>
+            <a:pPr marL="0" indent="0">
+              <a:buNone/>
+            </a:pPr>
+            <a:endParaRPr lang="en-US" sz="2400" dirty="0">
+              <a:latin typeface="Calibri" panose="020F0502020204030204" pitchFamily="34" charset="0"/>
+              <a:cs typeface="Calibri" panose="020F0502020204030204" pitchFamily="34" charset="0"/>
+            </a:endParaRPr>
           </a:p>
         </p:txBody>
       </p:sp>

</xml_diff>

<commit_message>
tweaks from mentor meeting on 10.16
</commit_message>
<xml_diff>
--- a/Capstone2_Final_Presentation.pptx
+++ b/Capstone2_Final_Presentation.pptx
@@ -206,7 +206,7 @@
           <a:p>
             <a:fld id="{F6F82602-1F16-C648-924E-E8B84F6ABC78}" type="datetimeFigureOut">
               <a:rPr lang="en-US" smtClean="0"/>
-              <a:t>10/18/20</a:t>
+              <a:t>10/20/20</a:t>
             </a:fld>
             <a:endParaRPr lang="en-US"/>
           </a:p>
@@ -770,7 +770,7 @@
           <a:p>
             <a:fld id="{7EA32AED-B185-5C4B-A96E-16B0A87C3CCF}" type="datetimeFigureOut">
               <a:rPr lang="en-US" smtClean="0"/>
-              <a:t>10/18/20</a:t>
+              <a:t>10/20/20</a:t>
             </a:fld>
             <a:endParaRPr lang="en-US"/>
           </a:p>
@@ -1061,7 +1061,7 @@
           <a:p>
             <a:fld id="{7EA32AED-B185-5C4B-A96E-16B0A87C3CCF}" type="datetimeFigureOut">
               <a:rPr lang="en-US" smtClean="0"/>
-              <a:t>10/18/20</a:t>
+              <a:t>10/20/20</a:t>
             </a:fld>
             <a:endParaRPr lang="en-US"/>
           </a:p>
@@ -1320,7 +1320,7 @@
           <a:p>
             <a:fld id="{7EA32AED-B185-5C4B-A96E-16B0A87C3CCF}" type="datetimeFigureOut">
               <a:rPr lang="en-US" smtClean="0"/>
-              <a:t>10/18/20</a:t>
+              <a:t>10/20/20</a:t>
             </a:fld>
             <a:endParaRPr lang="en-US"/>
           </a:p>
@@ -1789,7 +1789,7 @@
           <a:p>
             <a:fld id="{7EA32AED-B185-5C4B-A96E-16B0A87C3CCF}" type="datetimeFigureOut">
               <a:rPr lang="en-US" smtClean="0"/>
-              <a:t>10/18/20</a:t>
+              <a:t>10/20/20</a:t>
             </a:fld>
             <a:endParaRPr lang="en-US"/>
           </a:p>
@@ -1969,7 +1969,7 @@
           <a:p>
             <a:fld id="{7EA32AED-B185-5C4B-A96E-16B0A87C3CCF}" type="datetimeFigureOut">
               <a:rPr lang="en-US" smtClean="0"/>
-              <a:t>10/18/20</a:t>
+              <a:t>10/20/20</a:t>
             </a:fld>
             <a:endParaRPr lang="en-US"/>
           </a:p>
@@ -2545,7 +2545,7 @@
           <a:p>
             <a:fld id="{7EA32AED-B185-5C4B-A96E-16B0A87C3CCF}" type="datetimeFigureOut">
               <a:rPr lang="en-US" smtClean="0"/>
-              <a:t>10/18/20</a:t>
+              <a:t>10/20/20</a:t>
             </a:fld>
             <a:endParaRPr lang="en-US"/>
           </a:p>
@@ -2877,7 +2877,7 @@
           <a:p>
             <a:fld id="{7EA32AED-B185-5C4B-A96E-16B0A87C3CCF}" type="datetimeFigureOut">
               <a:rPr lang="en-US" smtClean="0"/>
-              <a:t>10/18/20</a:t>
+              <a:t>10/20/20</a:t>
             </a:fld>
             <a:endParaRPr lang="en-US"/>
           </a:p>
@@ -3052,7 +3052,7 @@
           <a:p>
             <a:fld id="{7EA32AED-B185-5C4B-A96E-16B0A87C3CCF}" type="datetimeFigureOut">
               <a:rPr lang="en-US" smtClean="0"/>
-              <a:t>10/18/20</a:t>
+              <a:t>10/20/20</a:t>
             </a:fld>
             <a:endParaRPr lang="en-US"/>
           </a:p>
@@ -3232,7 +3232,7 @@
           <a:p>
             <a:fld id="{7EA32AED-B185-5C4B-A96E-16B0A87C3CCF}" type="datetimeFigureOut">
               <a:rPr lang="en-US" smtClean="0"/>
-              <a:t>10/18/20</a:t>
+              <a:t>10/20/20</a:t>
             </a:fld>
             <a:endParaRPr lang="en-US"/>
           </a:p>
@@ -3402,7 +3402,7 @@
           <a:p>
             <a:fld id="{7EA32AED-B185-5C4B-A96E-16B0A87C3CCF}" type="datetimeFigureOut">
               <a:rPr lang="en-US" smtClean="0"/>
-              <a:t>10/18/20</a:t>
+              <a:t>10/20/20</a:t>
             </a:fld>
             <a:endParaRPr lang="en-US"/>
           </a:p>
@@ -3659,7 +3659,7 @@
           <a:p>
             <a:fld id="{7EA32AED-B185-5C4B-A96E-16B0A87C3CCF}" type="datetimeFigureOut">
               <a:rPr lang="en-US" smtClean="0"/>
-              <a:t>10/18/20</a:t>
+              <a:t>10/20/20</a:t>
             </a:fld>
             <a:endParaRPr lang="en-US"/>
           </a:p>
@@ -3951,7 +3951,7 @@
           <a:p>
             <a:fld id="{7EA32AED-B185-5C4B-A96E-16B0A87C3CCF}" type="datetimeFigureOut">
               <a:rPr lang="en-US" smtClean="0"/>
-              <a:t>10/18/20</a:t>
+              <a:t>10/20/20</a:t>
             </a:fld>
             <a:endParaRPr lang="en-US"/>
           </a:p>
@@ -4381,7 +4381,7 @@
           <a:p>
             <a:fld id="{7EA32AED-B185-5C4B-A96E-16B0A87C3CCF}" type="datetimeFigureOut">
               <a:rPr lang="en-US" smtClean="0"/>
-              <a:t>10/18/20</a:t>
+              <a:t>10/20/20</a:t>
             </a:fld>
             <a:endParaRPr lang="en-US"/>
           </a:p>
@@ -4499,7 +4499,7 @@
           <a:p>
             <a:fld id="{7EA32AED-B185-5C4B-A96E-16B0A87C3CCF}" type="datetimeFigureOut">
               <a:rPr lang="en-US" smtClean="0"/>
-              <a:t>10/18/20</a:t>
+              <a:t>10/20/20</a:t>
             </a:fld>
             <a:endParaRPr lang="en-US"/>
           </a:p>
@@ -4594,7 +4594,7 @@
           <a:p>
             <a:fld id="{7EA32AED-B185-5C4B-A96E-16B0A87C3CCF}" type="datetimeFigureOut">
               <a:rPr lang="en-US" smtClean="0"/>
-              <a:t>10/18/20</a:t>
+              <a:t>10/20/20</a:t>
             </a:fld>
             <a:endParaRPr lang="en-US"/>
           </a:p>
@@ -4877,7 +4877,7 @@
           <a:p>
             <a:fld id="{7EA32AED-B185-5C4B-A96E-16B0A87C3CCF}" type="datetimeFigureOut">
               <a:rPr lang="en-US" smtClean="0"/>
-              <a:t>10/18/20</a:t>
+              <a:t>10/20/20</a:t>
             </a:fld>
             <a:endParaRPr lang="en-US"/>
           </a:p>
@@ -5168,7 +5168,7 @@
           <a:p>
             <a:fld id="{7EA32AED-B185-5C4B-A96E-16B0A87C3CCF}" type="datetimeFigureOut">
               <a:rPr lang="en-US" smtClean="0"/>
-              <a:t>10/18/20</a:t>
+              <a:t>10/20/20</a:t>
             </a:fld>
             <a:endParaRPr lang="en-US"/>
           </a:p>
@@ -5399,7 +5399,7 @@
           <a:p>
             <a:fld id="{7EA32AED-B185-5C4B-A96E-16B0A87C3CCF}" type="datetimeFigureOut">
               <a:rPr lang="en-US" smtClean="0"/>
-              <a:t>10/18/20</a:t>
+              <a:t>10/20/20</a:t>
             </a:fld>
             <a:endParaRPr lang="en-US"/>
           </a:p>
@@ -6359,7 +6359,7 @@
                 <a:latin typeface="Calibri" panose="020F0502020204030204" pitchFamily="34" charset="0"/>
                 <a:cs typeface="Calibri" panose="020F0502020204030204" pitchFamily="34" charset="0"/>
               </a:rPr>
-              <a:t>Problem Statement</a:t>
+              <a:t>Executive Summary</a:t>
             </a:r>
             <a:endParaRPr lang="en-US" dirty="0">
               <a:latin typeface="Calibri" panose="020F0502020204030204" pitchFamily="34" charset="0"/>
@@ -6391,15 +6391,37 @@
           </a:bodyPr>
           <a:lstStyle/>
           <a:p>
-            <a:pPr marL="0" indent="0" fontAlgn="t">
-              <a:buNone/>
-            </a:pPr>
+            <a:pPr fontAlgn="t"/>
             <a:r>
               <a:rPr lang="en-US" sz="2400" dirty="0">
                 <a:latin typeface="Calibri" panose="020F0502020204030204" pitchFamily="34" charset="0"/>
                 <a:cs typeface="Calibri" panose="020F0502020204030204" pitchFamily="34" charset="0"/>
               </a:rPr>
               <a:t>MLB Player evaluators are always looking for ways to better Predict offensive value for the future. A predictive model could save a team millions by recommending one player over another.</a:t>
+            </a:r>
+          </a:p>
+          <a:p>
+            <a:pPr fontAlgn="t"/>
+            <a:r>
+              <a:rPr lang="en-US" sz="2400" dirty="0">
+                <a:latin typeface="Calibri" panose="020F0502020204030204" pitchFamily="34" charset="0"/>
+                <a:cs typeface="Calibri" panose="020F0502020204030204" pitchFamily="34" charset="0"/>
+              </a:rPr>
+              <a:t>Final model achieved </a:t>
+            </a:r>
+            <a:r>
+              <a:rPr lang="en-US" sz="2400" b="1" dirty="0">
+                <a:latin typeface="Calibri" panose="020F0502020204030204" pitchFamily="34" charset="0"/>
+                <a:cs typeface="Calibri" panose="020F0502020204030204" pitchFamily="34" charset="0"/>
+              </a:rPr>
+              <a:t>17.4%</a:t>
+            </a:r>
+            <a:r>
+              <a:rPr lang="en-US" sz="2400" dirty="0">
+                <a:latin typeface="Calibri" panose="020F0502020204030204" pitchFamily="34" charset="0"/>
+                <a:cs typeface="Calibri" panose="020F0502020204030204" pitchFamily="34" charset="0"/>
+              </a:rPr>
+              <a:t> lower error than using prior year OPS to predict</a:t>
             </a:r>
           </a:p>
         </p:txBody>
@@ -7067,7 +7089,7 @@
         </p:spPr>
         <p:txBody>
           <a:bodyPr anchor="t">
-            <a:normAutofit/>
+            <a:normAutofit lnSpcReduction="10000"/>
           </a:bodyPr>
           <a:lstStyle/>
           <a:p>
@@ -7080,6 +7102,16 @@
             </a:r>
           </a:p>
           <a:p>
+            <a:pPr lvl="1"/>
+            <a:r>
+              <a:rPr lang="en-US" sz="2200" dirty="0">
+                <a:latin typeface="Calibri" panose="020F0502020204030204" pitchFamily="34" charset="0"/>
+                <a:cs typeface="Calibri" panose="020F0502020204030204" pitchFamily="34" charset="0"/>
+              </a:rPr>
+              <a:t>17.4% better than using prior year OPS to predict</a:t>
+            </a:r>
+          </a:p>
+          <a:p>
             <a:r>
               <a:rPr lang="en-US" sz="2400" dirty="0">
                 <a:latin typeface="Calibri" panose="020F0502020204030204" pitchFamily="34" charset="0"/>
@@ -7092,10 +7124,10 @@
       </p:sp>
       <p:pic>
         <p:nvPicPr>
-          <p:cNvPr id="11" name="Picture 10" descr="Chart, scatter chart&#10;&#10;Description automatically generated">
+          <p:cNvPr id="4" name="Picture 3" descr="Chart, scatter chart&#10;&#10;Description automatically generated">
             <a:extLst>
               <a:ext uri="{FF2B5EF4-FFF2-40B4-BE49-F238E27FC236}">
-                <a16:creationId xmlns:a16="http://schemas.microsoft.com/office/drawing/2014/main" id="{145C7900-8CC7-B04B-8EF9-B0388C128958}"/>
+                <a16:creationId xmlns:a16="http://schemas.microsoft.com/office/drawing/2014/main" id="{595613C2-4BD1-AC4E-B4C2-D9F99CF266BC}"/>
               </a:ext>
             </a:extLst>
           </p:cNvPr>
@@ -7104,16 +7136,15 @@
           </p:cNvPicPr>
           <p:nvPr/>
         </p:nvPicPr>
-        <p:blipFill>
+        <p:blipFill rotWithShape="1">
           <a:blip r:embed="rId2"/>
-          <a:stretch>
-            <a:fillRect/>
-          </a:stretch>
+          <a:srcRect l="5450" t="4401" r="5450" b="4198"/>
+          <a:stretch/>
         </p:blipFill>
         <p:spPr>
           <a:xfrm>
-            <a:off x="5954485" y="3483429"/>
-            <a:ext cx="4587551" cy="3211285"/>
+            <a:off x="6094411" y="3570516"/>
+            <a:ext cx="4442960" cy="3190423"/>
           </a:xfrm>
           <a:prstGeom prst="rect">
             <a:avLst/>
@@ -7122,10 +7153,10 @@
       </p:pic>
       <p:pic>
         <p:nvPicPr>
-          <p:cNvPr id="12" name="Picture 11">
+          <p:cNvPr id="8" name="Picture 7">
             <a:extLst>
               <a:ext uri="{FF2B5EF4-FFF2-40B4-BE49-F238E27FC236}">
-                <a16:creationId xmlns:a16="http://schemas.microsoft.com/office/drawing/2014/main" id="{8F18CA68-A06A-7C4E-A6AA-B30DED626F30}"/>
+                <a16:creationId xmlns:a16="http://schemas.microsoft.com/office/drawing/2014/main" id="{FB031721-00C4-E845-94DD-88CB05F45887}"/>
               </a:ext>
             </a:extLst>
           </p:cNvPr>
@@ -7142,8 +7173,8 @@
         </p:blipFill>
         <p:spPr>
           <a:xfrm>
-            <a:off x="1141411" y="3483428"/>
-            <a:ext cx="4704218" cy="775953"/>
+            <a:off x="1141411" y="3570516"/>
+            <a:ext cx="4704218" cy="850480"/>
           </a:xfrm>
           <a:prstGeom prst="rect">
             <a:avLst/>

</xml_diff>